<commit_message>
code and js features start
</commit_message>
<xml_diff>
--- a/docs/01.pptx
+++ b/docs/01.pptx
@@ -219,7 +219,7 @@
           <a:p>
             <a:fld id="{CB1C2BA7-0370-4E4B-9997-E70834CB9037}" type="datetimeFigureOut">
               <a:rPr lang="ru-RU" smtClean="0"/>
-              <a:t>25.04.2016</a:t>
+              <a:t>26.04.2016</a:t>
             </a:fld>
             <a:endParaRPr lang="ru-RU"/>
           </a:p>
@@ -1267,7 +1267,7 @@
             <a:fld id="{1D8BD707-D9CF-40AE-B4C6-C98DA3205C09}" type="datetimeFigureOut">
               <a:rPr lang="en-US" smtClean="0"/>
               <a:pPr/>
-              <a:t>4/25/2016</a:t>
+              <a:t>4/26/2016</a:t>
             </a:fld>
             <a:endParaRPr lang="en-US"/>
           </a:p>
@@ -1434,7 +1434,7 @@
             <a:fld id="{1D8BD707-D9CF-40AE-B4C6-C98DA3205C09}" type="datetimeFigureOut">
               <a:rPr lang="en-US" smtClean="0"/>
               <a:pPr/>
-              <a:t>4/25/2016</a:t>
+              <a:t>4/26/2016</a:t>
             </a:fld>
             <a:endParaRPr lang="en-US"/>
           </a:p>
@@ -1611,7 +1611,7 @@
             <a:fld id="{1D8BD707-D9CF-40AE-B4C6-C98DA3205C09}" type="datetimeFigureOut">
               <a:rPr lang="en-US" smtClean="0"/>
               <a:pPr/>
-              <a:t>4/25/2016</a:t>
+              <a:t>4/26/2016</a:t>
             </a:fld>
             <a:endParaRPr lang="en-US"/>
           </a:p>
@@ -1778,7 +1778,7 @@
             <a:fld id="{1D8BD707-D9CF-40AE-B4C6-C98DA3205C09}" type="datetimeFigureOut">
               <a:rPr lang="en-US" smtClean="0"/>
               <a:pPr/>
-              <a:t>4/25/2016</a:t>
+              <a:t>4/26/2016</a:t>
             </a:fld>
             <a:endParaRPr lang="en-US"/>
           </a:p>
@@ -2021,7 +2021,7 @@
             <a:fld id="{1D8BD707-D9CF-40AE-B4C6-C98DA3205C09}" type="datetimeFigureOut">
               <a:rPr lang="en-US" smtClean="0"/>
               <a:pPr/>
-              <a:t>4/25/2016</a:t>
+              <a:t>4/26/2016</a:t>
             </a:fld>
             <a:endParaRPr lang="en-US"/>
           </a:p>
@@ -2306,7 +2306,7 @@
             <a:fld id="{1D8BD707-D9CF-40AE-B4C6-C98DA3205C09}" type="datetimeFigureOut">
               <a:rPr lang="en-US" smtClean="0"/>
               <a:pPr/>
-              <a:t>4/25/2016</a:t>
+              <a:t>4/26/2016</a:t>
             </a:fld>
             <a:endParaRPr lang="en-US"/>
           </a:p>
@@ -2725,7 +2725,7 @@
             <a:fld id="{1D8BD707-D9CF-40AE-B4C6-C98DA3205C09}" type="datetimeFigureOut">
               <a:rPr lang="en-US" smtClean="0"/>
               <a:pPr/>
-              <a:t>4/25/2016</a:t>
+              <a:t>4/26/2016</a:t>
             </a:fld>
             <a:endParaRPr lang="en-US"/>
           </a:p>
@@ -2840,7 +2840,7 @@
             <a:fld id="{1D8BD707-D9CF-40AE-B4C6-C98DA3205C09}" type="datetimeFigureOut">
               <a:rPr lang="en-US" smtClean="0"/>
               <a:pPr/>
-              <a:t>4/25/2016</a:t>
+              <a:t>4/26/2016</a:t>
             </a:fld>
             <a:endParaRPr lang="en-US"/>
           </a:p>
@@ -2932,7 +2932,7 @@
             <a:fld id="{1D8BD707-D9CF-40AE-B4C6-C98DA3205C09}" type="datetimeFigureOut">
               <a:rPr lang="en-US" smtClean="0"/>
               <a:pPr/>
-              <a:t>4/25/2016</a:t>
+              <a:t>4/26/2016</a:t>
             </a:fld>
             <a:endParaRPr lang="en-US"/>
           </a:p>
@@ -3206,7 +3206,7 @@
             <a:fld id="{1D8BD707-D9CF-40AE-B4C6-C98DA3205C09}" type="datetimeFigureOut">
               <a:rPr lang="en-US" smtClean="0"/>
               <a:pPr/>
-              <a:t>4/25/2016</a:t>
+              <a:t>4/26/2016</a:t>
             </a:fld>
             <a:endParaRPr lang="en-US"/>
           </a:p>
@@ -3456,7 +3456,7 @@
             <a:fld id="{1D8BD707-D9CF-40AE-B4C6-C98DA3205C09}" type="datetimeFigureOut">
               <a:rPr lang="en-US" smtClean="0"/>
               <a:pPr/>
-              <a:t>4/25/2016</a:t>
+              <a:t>4/26/2016</a:t>
             </a:fld>
             <a:endParaRPr lang="en-US"/>
           </a:p>
@@ -3671,7 +3671,7 @@
             <a:fld id="{1D8BD707-D9CF-40AE-B4C6-C98DA3205C09}" type="datetimeFigureOut">
               <a:rPr lang="en-US" smtClean="0"/>
               <a:pPr/>
-              <a:t>4/25/2016</a:t>
+              <a:t>4/26/2016</a:t>
             </a:fld>
             <a:endParaRPr lang="en-US"/>
           </a:p>
@@ -4487,11 +4487,11 @@
   <p:clrMapOvr>
     <a:masterClrMapping/>
   </p:clrMapOvr>
-  <mc:AlternateContent xmlns:mc="http://schemas.openxmlformats.org/markup-compatibility/2006">
-    <mc:Choice xmlns:p14="http://schemas.microsoft.com/office/powerpoint/2010/main" Requires="p14">
+  <mc:AlternateContent xmlns:mc="http://schemas.openxmlformats.org/markup-compatibility/2006" xmlns:p14="http://schemas.microsoft.com/office/powerpoint/2010/main">
+    <mc:Choice Requires="p14">
       <p:transition spd="slow" p14:dur="2000"/>
     </mc:Choice>
-    <mc:Fallback>
+    <mc:Fallback xmlns="">
       <p:transition spd="slow"/>
     </mc:Fallback>
   </mc:AlternateContent>
@@ -4617,11 +4617,11 @@
   <p:clrMapOvr>
     <a:masterClrMapping/>
   </p:clrMapOvr>
-  <mc:AlternateContent xmlns:mc="http://schemas.openxmlformats.org/markup-compatibility/2006">
-    <mc:Choice xmlns:p14="http://schemas.microsoft.com/office/powerpoint/2010/main" Requires="p14">
+  <mc:AlternateContent xmlns:mc="http://schemas.openxmlformats.org/markup-compatibility/2006" xmlns:p14="http://schemas.microsoft.com/office/powerpoint/2010/main">
+    <mc:Choice Requires="p14">
       <p:transition spd="slow" p14:dur="2000"/>
     </mc:Choice>
-    <mc:Fallback>
+    <mc:Fallback xmlns="">
       <p:transition spd="slow"/>
     </mc:Fallback>
   </mc:AlternateContent>
@@ -4801,10 +4801,16 @@
               <a:buNone/>
             </a:pPr>
             <a:r>
-              <a:rPr lang="en-US" sz="2400" dirty="0" smtClean="0"/>
+              <a:rPr lang="en-US" sz="1600" dirty="0" smtClean="0">
+                <a:latin typeface="Courier New" panose="02070309020205020404" pitchFamily="49" charset="0"/>
+                <a:cs typeface="Courier New" panose="02070309020205020404" pitchFamily="49" charset="0"/>
+              </a:rPr>
               <a:t>create model with 2 arguments</a:t>
             </a:r>
-            <a:endParaRPr lang="ru-RU" sz="2400" dirty="0"/>
+            <a:endParaRPr lang="ru-RU" sz="1600" dirty="0">
+              <a:latin typeface="Courier New" panose="02070309020205020404" pitchFamily="49" charset="0"/>
+              <a:cs typeface="Courier New" panose="02070309020205020404" pitchFamily="49" charset="0"/>
+            </a:endParaRPr>
           </a:p>
         </p:txBody>
       </p:sp>
@@ -5380,7 +5386,7 @@
         </p:nvSpPr>
         <p:spPr>
           <a:xfrm>
-            <a:off x="457200" y="2676899"/>
+            <a:off x="457200" y="2743200"/>
             <a:ext cx="8229600" cy="755400"/>
           </a:xfrm>
           <a:prstGeom prst="rect">
@@ -5530,22 +5536,33 @@
           </a:lstStyle>
           <a:p>
             <a:pPr marL="0" indent="0">
-              <a:buFont typeface="Arial" pitchFamily="34" charset="0"/>
               <a:buNone/>
             </a:pPr>
             <a:r>
-              <a:rPr lang="en-US" sz="2400" dirty="0"/>
+              <a:rPr lang="en-US" sz="1600" dirty="0">
+                <a:latin typeface="Courier New" panose="02070309020205020404" pitchFamily="49" charset="0"/>
+                <a:cs typeface="Courier New" panose="02070309020205020404" pitchFamily="49" charset="0"/>
+              </a:rPr>
               <a:t>g</a:t>
             </a:r>
             <a:r>
-              <a:rPr lang="en-US" sz="2400" dirty="0" smtClean="0"/>
+              <a:rPr lang="en-US" sz="1600" dirty="0">
+                <a:latin typeface="Courier New" panose="02070309020205020404" pitchFamily="49" charset="0"/>
+                <a:cs typeface="Courier New" panose="02070309020205020404" pitchFamily="49" charset="0"/>
+              </a:rPr>
               <a:t>et the created model with 1 </a:t>
             </a:r>
             <a:r>
-              <a:rPr lang="en-US" sz="2400" dirty="0" err="1" smtClean="0"/>
+              <a:rPr lang="en-US" sz="1600" dirty="0" err="1">
+                <a:latin typeface="Courier New" panose="02070309020205020404" pitchFamily="49" charset="0"/>
+                <a:cs typeface="Courier New" panose="02070309020205020404" pitchFamily="49" charset="0"/>
+              </a:rPr>
               <a:t>arg</a:t>
             </a:r>
-            <a:endParaRPr lang="ru-RU" sz="2400" dirty="0"/>
+            <a:endParaRPr lang="ru-RU" sz="1600" dirty="0">
+              <a:latin typeface="Courier New" panose="02070309020205020404" pitchFamily="49" charset="0"/>
+              <a:cs typeface="Courier New" panose="02070309020205020404" pitchFamily="49" charset="0"/>
+            </a:endParaRPr>
           </a:p>
         </p:txBody>
       </p:sp>
@@ -5559,7 +5576,7 @@
         </p:nvSpPr>
         <p:spPr>
           <a:xfrm>
-            <a:off x="457200" y="3733477"/>
+            <a:off x="457200" y="3892800"/>
             <a:ext cx="8229600" cy="755400"/>
           </a:xfrm>
           <a:prstGeom prst="rect">
@@ -5709,14 +5726,19 @@
           </a:lstStyle>
           <a:p>
             <a:pPr marL="0" indent="0">
-              <a:buFont typeface="Arial" pitchFamily="34" charset="0"/>
               <a:buNone/>
             </a:pPr>
             <a:r>
-              <a:rPr lang="en-US" sz="2400" dirty="0" smtClean="0"/>
+              <a:rPr lang="en-US" sz="1600" dirty="0">
+                <a:latin typeface="Courier New" panose="02070309020205020404" pitchFamily="49" charset="0"/>
+                <a:cs typeface="Courier New" panose="02070309020205020404" pitchFamily="49" charset="0"/>
+              </a:rPr>
               <a:t>call controller function on module instance</a:t>
             </a:r>
-            <a:endParaRPr lang="ru-RU" sz="2400" dirty="0"/>
+            <a:endParaRPr lang="ru-RU" sz="1600" dirty="0">
+              <a:latin typeface="Courier New" panose="02070309020205020404" pitchFamily="49" charset="0"/>
+              <a:cs typeface="Courier New" panose="02070309020205020404" pitchFamily="49" charset="0"/>
+            </a:endParaRPr>
           </a:p>
         </p:txBody>
       </p:sp>

</xml_diff>